<commit_message>
revise slides & tuned logreg c
</commit_message>
<xml_diff>
--- a/presentation.pptx
+++ b/presentation.pptx
@@ -202,7 +202,7 @@
           <a:p>
             <a:fld id="{F33C5BE3-C357-FC47-A07E-E790BC6AF8E9}" type="datetimeFigureOut">
               <a:rPr kumimoji="1" lang="zh-TW" altLang="en-US" smtClean="0"/>
-              <a:t>2023/8/23</a:t>
+              <a:t>2023/8/25</a:t>
             </a:fld>
             <a:endParaRPr kumimoji="1" lang="zh-TW" altLang="en-US"/>
           </a:p>
@@ -880,7 +880,7 @@
           <a:p>
             <a:fld id="{64E2D414-BB43-CA40-9C69-690547A23705}" type="datetimeFigureOut">
               <a:rPr kumimoji="1" lang="zh-TW" altLang="en-US" smtClean="0"/>
-              <a:t>2023/8/23</a:t>
+              <a:t>2023/8/25</a:t>
             </a:fld>
             <a:endParaRPr kumimoji="1" lang="zh-TW" altLang="en-US"/>
           </a:p>
@@ -1078,7 +1078,7 @@
           <a:p>
             <a:fld id="{64E2D414-BB43-CA40-9C69-690547A23705}" type="datetimeFigureOut">
               <a:rPr kumimoji="1" lang="zh-TW" altLang="en-US" smtClean="0"/>
-              <a:t>2023/8/23</a:t>
+              <a:t>2023/8/25</a:t>
             </a:fld>
             <a:endParaRPr kumimoji="1" lang="zh-TW" altLang="en-US"/>
           </a:p>
@@ -1286,7 +1286,7 @@
           <a:p>
             <a:fld id="{64E2D414-BB43-CA40-9C69-690547A23705}" type="datetimeFigureOut">
               <a:rPr kumimoji="1" lang="zh-TW" altLang="en-US" smtClean="0"/>
-              <a:t>2023/8/23</a:t>
+              <a:t>2023/8/25</a:t>
             </a:fld>
             <a:endParaRPr kumimoji="1" lang="zh-TW" altLang="en-US"/>
           </a:p>
@@ -1484,7 +1484,7 @@
           <a:p>
             <a:fld id="{64E2D414-BB43-CA40-9C69-690547A23705}" type="datetimeFigureOut">
               <a:rPr kumimoji="1" lang="zh-TW" altLang="en-US" smtClean="0"/>
-              <a:t>2023/8/23</a:t>
+              <a:t>2023/8/25</a:t>
             </a:fld>
             <a:endParaRPr kumimoji="1" lang="zh-TW" altLang="en-US"/>
           </a:p>
@@ -1759,7 +1759,7 @@
           <a:p>
             <a:fld id="{64E2D414-BB43-CA40-9C69-690547A23705}" type="datetimeFigureOut">
               <a:rPr kumimoji="1" lang="zh-TW" altLang="en-US" smtClean="0"/>
-              <a:t>2023/8/23</a:t>
+              <a:t>2023/8/25</a:t>
             </a:fld>
             <a:endParaRPr kumimoji="1" lang="zh-TW" altLang="en-US"/>
           </a:p>
@@ -2024,7 +2024,7 @@
           <a:p>
             <a:fld id="{64E2D414-BB43-CA40-9C69-690547A23705}" type="datetimeFigureOut">
               <a:rPr kumimoji="1" lang="zh-TW" altLang="en-US" smtClean="0"/>
-              <a:t>2023/8/23</a:t>
+              <a:t>2023/8/25</a:t>
             </a:fld>
             <a:endParaRPr kumimoji="1" lang="zh-TW" altLang="en-US"/>
           </a:p>
@@ -2436,7 +2436,7 @@
           <a:p>
             <a:fld id="{64E2D414-BB43-CA40-9C69-690547A23705}" type="datetimeFigureOut">
               <a:rPr kumimoji="1" lang="zh-TW" altLang="en-US" smtClean="0"/>
-              <a:t>2023/8/23</a:t>
+              <a:t>2023/8/25</a:t>
             </a:fld>
             <a:endParaRPr kumimoji="1" lang="zh-TW" altLang="en-US"/>
           </a:p>
@@ -2577,7 +2577,7 @@
           <a:p>
             <a:fld id="{64E2D414-BB43-CA40-9C69-690547A23705}" type="datetimeFigureOut">
               <a:rPr kumimoji="1" lang="zh-TW" altLang="en-US" smtClean="0"/>
-              <a:t>2023/8/23</a:t>
+              <a:t>2023/8/25</a:t>
             </a:fld>
             <a:endParaRPr kumimoji="1" lang="zh-TW" altLang="en-US"/>
           </a:p>
@@ -2690,7 +2690,7 @@
           <a:p>
             <a:fld id="{64E2D414-BB43-CA40-9C69-690547A23705}" type="datetimeFigureOut">
               <a:rPr kumimoji="1" lang="zh-TW" altLang="en-US" smtClean="0"/>
-              <a:t>2023/8/23</a:t>
+              <a:t>2023/8/25</a:t>
             </a:fld>
             <a:endParaRPr kumimoji="1" lang="zh-TW" altLang="en-US"/>
           </a:p>
@@ -3001,7 +3001,7 @@
           <a:p>
             <a:fld id="{64E2D414-BB43-CA40-9C69-690547A23705}" type="datetimeFigureOut">
               <a:rPr kumimoji="1" lang="zh-TW" altLang="en-US" smtClean="0"/>
-              <a:t>2023/8/23</a:t>
+              <a:t>2023/8/25</a:t>
             </a:fld>
             <a:endParaRPr kumimoji="1" lang="zh-TW" altLang="en-US"/>
           </a:p>
@@ -3289,7 +3289,7 @@
           <a:p>
             <a:fld id="{64E2D414-BB43-CA40-9C69-690547A23705}" type="datetimeFigureOut">
               <a:rPr kumimoji="1" lang="zh-TW" altLang="en-US" smtClean="0"/>
-              <a:t>2023/8/23</a:t>
+              <a:t>2023/8/25</a:t>
             </a:fld>
             <a:endParaRPr kumimoji="1" lang="zh-TW" altLang="en-US"/>
           </a:p>
@@ -3530,7 +3530,7 @@
           <a:p>
             <a:fld id="{64E2D414-BB43-CA40-9C69-690547A23705}" type="datetimeFigureOut">
               <a:rPr kumimoji="1" lang="zh-TW" altLang="en-US" smtClean="0"/>
-              <a:t>2023/8/23</a:t>
+              <a:t>2023/8/25</a:t>
             </a:fld>
             <a:endParaRPr kumimoji="1" lang="zh-TW" altLang="en-US"/>
           </a:p>
@@ -4427,7 +4427,7 @@
           <a:p>
             <a:r>
               <a:rPr kumimoji="1" lang="en-GB" altLang="zh-TW" dirty="0"/>
-              <a:t>0: 271 instances</a:t>
+              <a:t>271 instances have area=0</a:t>
             </a:r>
           </a:p>
           <a:p>
@@ -6358,18 +6358,50 @@
                   <a:schemeClr val="tx1"/>
                 </a:solidFill>
               </a:rPr>
-              <a:t>R^2: 0.0183</a:t>
-            </a:r>
-          </a:p>
-          <a:p>
-            <a:pPr algn="ctr"/>
+              <a:t>R</a:t>
+            </a:r>
+            <a:r>
+              <a:rPr kumimoji="1" lang="en-GB" altLang="zh-TW" sz="2400" baseline="30000" dirty="0">
+                <a:solidFill>
+                  <a:schemeClr val="tx1"/>
+                </a:solidFill>
+              </a:rPr>
+              <a:t>2</a:t>
+            </a:r>
             <a:r>
               <a:rPr kumimoji="1" lang="en-GB" altLang="zh-TW" sz="2400" dirty="0">
                 <a:solidFill>
                   <a:schemeClr val="tx1"/>
                 </a:solidFill>
               </a:rPr>
-              <a:t>R^2 w/kernel: 0.0213</a:t>
+              <a:t>: 0.0204</a:t>
+            </a:r>
+          </a:p>
+          <a:p>
+            <a:pPr algn="ctr"/>
+            <a:r>
+              <a:rPr kumimoji="1" lang="en-GB" altLang="zh-TW" sz="2400" dirty="0">
+                <a:solidFill>
+                  <a:schemeClr val="tx1"/>
+                </a:solidFill>
+              </a:rPr>
+              <a:t>R</a:t>
+            </a:r>
+            <a:r>
+              <a:rPr kumimoji="1" lang="en-GB" altLang="zh-TW" sz="2400" baseline="30000" dirty="0">
+                <a:solidFill>
+                  <a:schemeClr val="tx1"/>
+                </a:solidFill>
+              </a:rPr>
+              <a:t>2</a:t>
+            </a:r>
+            <a:r>
+              <a:rPr kumimoji="1" lang="en-GB" altLang="zh-TW" sz="2400" dirty="0">
+                <a:solidFill>
+                  <a:schemeClr val="tx1"/>
+                </a:solidFill>
+              </a:rPr>
+              <a:t> w/kernel: 0.0238</a:t>
             </a:r>
             <a:endParaRPr kumimoji="1" lang="zh-TW" altLang="en-US" sz="2400" dirty="0">
               <a:solidFill>
@@ -7352,7 +7384,23 @@
                   <a:schemeClr val="tx1"/>
                 </a:solidFill>
               </a:rPr>
-              <a:t>R^2: 0.4470</a:t>
+              <a:t>R</a:t>
+            </a:r>
+            <a:r>
+              <a:rPr kumimoji="1" lang="en-GB" altLang="zh-TW" sz="2400" baseline="30000" dirty="0">
+                <a:solidFill>
+                  <a:schemeClr val="tx1"/>
+                </a:solidFill>
+              </a:rPr>
+              <a:t>2</a:t>
+            </a:r>
+            <a:r>
+              <a:rPr kumimoji="1" lang="en-GB" altLang="zh-TW" sz="2400" dirty="0">
+                <a:solidFill>
+                  <a:schemeClr val="tx1"/>
+                </a:solidFill>
+              </a:rPr>
+              <a:t>: 0.4748</a:t>
             </a:r>
           </a:p>
         </p:txBody>
@@ -7409,7 +7457,7 @@
                   <a:schemeClr val="tx1"/>
                 </a:solidFill>
               </a:rPr>
-              <a:t>Accuracy: 0.5673</a:t>
+              <a:t>Accuracy: 0.5384</a:t>
             </a:r>
             <a:endParaRPr kumimoji="1" lang="zh-TW" altLang="en-US" sz="2400" dirty="0">
               <a:solidFill>
@@ -7471,7 +7519,23 @@
                   <a:schemeClr val="tx1"/>
                 </a:solidFill>
               </a:rPr>
-              <a:t>R^2: 0.1570</a:t>
+              <a:t>R</a:t>
+            </a:r>
+            <a:r>
+              <a:rPr kumimoji="1" lang="en-GB" altLang="zh-TW" sz="2400" baseline="30000" dirty="0">
+                <a:solidFill>
+                  <a:schemeClr val="tx1"/>
+                </a:solidFill>
+              </a:rPr>
+              <a:t>2</a:t>
+            </a:r>
+            <a:r>
+              <a:rPr kumimoji="1" lang="en-GB" altLang="zh-TW" sz="2400" dirty="0">
+                <a:solidFill>
+                  <a:schemeClr val="tx1"/>
+                </a:solidFill>
+              </a:rPr>
+              <a:t>: 0.2367</a:t>
             </a:r>
           </a:p>
         </p:txBody>

</xml_diff>

<commit_message>
add correlation map to slides
</commit_message>
<xml_diff>
--- a/presentation.pptx
+++ b/presentation.pptx
@@ -603,6 +603,94 @@
           <a:p>
             <a:r>
               <a:rPr kumimoji="1" lang="en-GB" altLang="zh-TW" dirty="0"/>
+              <a:t>Observations: weak correlation between features; sparse values</a:t>
+            </a:r>
+            <a:endParaRPr kumimoji="1" lang="zh-TW" altLang="en-US" dirty="0"/>
+          </a:p>
+        </p:txBody>
+      </p:sp>
+      <p:sp>
+        <p:nvSpPr>
+          <p:cNvPr id="4" name="投影片編號版面配置區 3"/>
+          <p:cNvSpPr>
+            <a:spLocks noGrp="1"/>
+          </p:cNvSpPr>
+          <p:nvPr>
+            <p:ph type="sldNum" sz="quarter" idx="5"/>
+          </p:nvPr>
+        </p:nvSpPr>
+        <p:spPr/>
+        <p:txBody>
+          <a:bodyPr/>
+          <a:lstStyle/>
+          <a:p>
+            <a:fld id="{13F564C4-9FB0-B34C-AF75-38FC6FE59309}" type="slidenum">
+              <a:rPr kumimoji="1" lang="zh-TW" altLang="en-US" smtClean="0"/>
+              <a:t>2</a:t>
+            </a:fld>
+            <a:endParaRPr kumimoji="1" lang="zh-TW" altLang="en-US"/>
+          </a:p>
+        </p:txBody>
+      </p:sp>
+    </p:spTree>
+    <p:extLst>
+      <p:ext uri="{BB962C8B-B14F-4D97-AF65-F5344CB8AC3E}">
+        <p14:creationId xmlns:p14="http://schemas.microsoft.com/office/powerpoint/2010/main" val="1252529089"/>
+      </p:ext>
+    </p:extLst>
+  </p:cSld>
+  <p:clrMapOvr>
+    <a:masterClrMapping/>
+  </p:clrMapOvr>
+</p:notes>
+</file>
+
+<file path=ppt/notesSlides/notesSlide3.xml><?xml version="1.0" encoding="utf-8"?>
+<p:notes xmlns:a="http://schemas.openxmlformats.org/drawingml/2006/main" xmlns:r="http://schemas.openxmlformats.org/officeDocument/2006/relationships" xmlns:p="http://schemas.openxmlformats.org/presentationml/2006/main">
+  <p:cSld>
+    <p:spTree>
+      <p:nvGrpSpPr>
+        <p:cNvPr id="1" name=""/>
+        <p:cNvGrpSpPr/>
+        <p:nvPr/>
+      </p:nvGrpSpPr>
+      <p:grpSpPr>
+        <a:xfrm>
+          <a:off x="0" y="0"/>
+          <a:ext cx="0" cy="0"/>
+          <a:chOff x="0" y="0"/>
+          <a:chExt cx="0" cy="0"/>
+        </a:xfrm>
+      </p:grpSpPr>
+      <p:sp>
+        <p:nvSpPr>
+          <p:cNvPr id="2" name="投影片影像版面配置區 1"/>
+          <p:cNvSpPr>
+            <a:spLocks noGrp="1" noRot="1" noChangeAspect="1"/>
+          </p:cNvSpPr>
+          <p:nvPr>
+            <p:ph type="sldImg"/>
+          </p:nvPr>
+        </p:nvSpPr>
+        <p:spPr/>
+      </p:sp>
+      <p:sp>
+        <p:nvSpPr>
+          <p:cNvPr id="3" name="備忘稿版面配置區 2"/>
+          <p:cNvSpPr>
+            <a:spLocks noGrp="1"/>
+          </p:cNvSpPr>
+          <p:nvPr>
+            <p:ph type="body" idx="1"/>
+          </p:nvPr>
+        </p:nvSpPr>
+        <p:spPr/>
+        <p:txBody>
+          <a:bodyPr/>
+          <a:lstStyle/>
+          <a:p>
+            <a:r>
+              <a:rPr kumimoji="1" lang="en-GB" altLang="zh-TW" dirty="0"/>
               <a:t>271 out of 517 instances have area == 0</a:t>
             </a:r>
             <a:endParaRPr kumimoji="1" lang="zh-TW" altLang="en-US" dirty="0"/>
@@ -645,7 +733,7 @@
 </p:notes>
 </file>
 
-<file path=ppt/notesSlides/notesSlide3.xml><?xml version="1.0" encoding="utf-8"?>
+<file path=ppt/notesSlides/notesSlide4.xml><?xml version="1.0" encoding="utf-8"?>
 <p:notes xmlns:a="http://schemas.openxmlformats.org/drawingml/2006/main" xmlns:r="http://schemas.openxmlformats.org/officeDocument/2006/relationships" xmlns:p="http://schemas.openxmlformats.org/presentationml/2006/main">
   <p:cSld>
     <p:spTree>
@@ -4131,15 +4219,15 @@
           </p:nvPr>
         </p:nvPicPr>
         <p:blipFill>
-          <a:blip r:embed="rId2"/>
+          <a:blip r:embed="rId3"/>
           <a:stretch>
             <a:fillRect/>
           </a:stretch>
         </p:blipFill>
         <p:spPr>
           <a:xfrm>
-            <a:off x="1884040" y="1690688"/>
-            <a:ext cx="8331729" cy="4613206"/>
+            <a:off x="4254361" y="1780487"/>
+            <a:ext cx="7437120" cy="4117869"/>
           </a:xfrm>
         </p:spPr>
       </p:pic>
@@ -4157,8 +4245,8 @@
         </p:nvSpPr>
         <p:spPr>
           <a:xfrm>
-            <a:off x="3896139" y="3140766"/>
-            <a:ext cx="2358887" cy="1470992"/>
+            <a:off x="6096001" y="3113227"/>
+            <a:ext cx="2105604" cy="1307512"/>
           </a:xfrm>
           <a:prstGeom prst="rect">
             <a:avLst/>
@@ -4212,8 +4300,8 @@
         </p:nvSpPr>
         <p:spPr>
           <a:xfrm>
-            <a:off x="5903843" y="1663149"/>
-            <a:ext cx="2358887" cy="1470992"/>
+            <a:off x="7825699" y="1782630"/>
+            <a:ext cx="2105604" cy="1307512"/>
           </a:xfrm>
           <a:prstGeom prst="rect">
             <a:avLst/>
@@ -4267,8 +4355,8 @@
         </p:nvSpPr>
         <p:spPr>
           <a:xfrm>
-            <a:off x="3896138" y="4618383"/>
-            <a:ext cx="2358887" cy="1470992"/>
+            <a:off x="6096000" y="4420739"/>
+            <a:ext cx="2105604" cy="1307512"/>
           </a:xfrm>
           <a:prstGeom prst="rect">
             <a:avLst/>
@@ -4308,6 +4396,36 @@
           </a:p>
         </p:txBody>
       </p:sp>
+      <p:pic>
+        <p:nvPicPr>
+          <p:cNvPr id="3" name="圖片 2">
+            <a:extLst>
+              <a:ext uri="{FF2B5EF4-FFF2-40B4-BE49-F238E27FC236}">
+                <a16:creationId xmlns:a16="http://schemas.microsoft.com/office/drawing/2014/main" id="{9034E7AB-D9F0-8F6E-B3C2-FDD2227313B1}"/>
+              </a:ext>
+            </a:extLst>
+          </p:cNvPr>
+          <p:cNvPicPr>
+            <a:picLocks noChangeAspect="1"/>
+          </p:cNvPicPr>
+          <p:nvPr/>
+        </p:nvPicPr>
+        <p:blipFill>
+          <a:blip r:embed="rId4"/>
+          <a:stretch>
+            <a:fillRect/>
+          </a:stretch>
+        </p:blipFill>
+        <p:spPr>
+          <a:xfrm>
+            <a:off x="500519" y="2175272"/>
+            <a:ext cx="3403600" cy="3238500"/>
+          </a:xfrm>
+          <a:prstGeom prst="rect">
+            <a:avLst/>
+          </a:prstGeom>
+        </p:spPr>
+      </p:pic>
     </p:spTree>
     <p:extLst>
       <p:ext uri="{BB962C8B-B14F-4D97-AF65-F5344CB8AC3E}">

</xml_diff>